<commit_message>
updates to classify error, jonathan intuition!
</commit_message>
<xml_diff>
--- a/src/ml_final_project/PosterPresentation.pptx
+++ b/src/ml_final_project/PosterPresentation.pptx
@@ -14251,11 +14251,13 @@
         </p:nvSpPr>
         <p:spPr/>
         <p:txBody>
-          <a:bodyPr/>
+          <a:bodyPr>
+            <a:normAutofit/>
+          </a:bodyPr>
           <a:lstStyle/>
           <a:p>
             <a:r>
-              <a:rPr lang="en-US" sz="3200" dirty="0"/>
+              <a:rPr lang="en-US" sz="2400" dirty="0"/>
               <a:t>Regression Model</a:t>
             </a:r>
           </a:p>
@@ -14263,13 +14265,13 @@
             <a:endParaRPr lang="en-US" dirty="0"/>
           </a:p>
           <a:p>
-            <a:endParaRPr lang="en-US" dirty="0"/>
-          </a:p>
-          <a:p>
-            <a:r>
-              <a:rPr lang="en-US" sz="3200" dirty="0"/>
-              <a:t>Decision Tree</a:t>
-            </a:r>
+            <a:endParaRPr lang="en-US" dirty="0" smtClean="0"/>
+          </a:p>
+          <a:p>
+            <a:pPr marL="0" indent="0">
+              <a:buNone/>
+            </a:pPr>
+            <a:endParaRPr lang="en-US" dirty="0" smtClean="0"/>
           </a:p>
           <a:p>
             <a:pPr marL="0" indent="0">
@@ -14278,23 +14280,149 @@
             <a:endParaRPr lang="en-US" dirty="0"/>
           </a:p>
           <a:p>
+            <a:r>
+              <a:rPr lang="en-US" sz="2400" dirty="0"/>
+              <a:t>Decision Tree</a:t>
+            </a:r>
+          </a:p>
+          <a:p>
+            <a:pPr marL="0" indent="0">
+              <a:buNone/>
+            </a:pPr>
             <a:endParaRPr lang="en-US" dirty="0"/>
           </a:p>
           <a:p>
-            <a:r>
-              <a:rPr lang="en-US" sz="3200" dirty="0" err="1"/>
-              <a:t>AdaBoost</a:t>
-            </a:r>
-            <a:r>
-              <a:rPr lang="en-US" sz="3200" dirty="0"/>
-              <a:t> Framework</a:t>
-            </a:r>
+            <a:endParaRPr lang="en-US" dirty="0"/>
           </a:p>
           <a:p>
             <a:endParaRPr lang="en-US" dirty="0"/>
           </a:p>
         </p:txBody>
       </p:sp>
+      <p:pic>
+        <p:nvPicPr>
+          <p:cNvPr id="4" name="Picture 3"/>
+          <p:cNvPicPr>
+            <a:picLocks noChangeAspect="1"/>
+          </p:cNvPicPr>
+          <p:nvPr/>
+        </p:nvPicPr>
+        <p:blipFill>
+          <a:blip r:embed="rId2">
+            <a:extLst>
+              <a:ext uri="{28A0092B-C50C-407E-A947-70E740481C1C}">
+                <a14:useLocalDpi xmlns:a14="http://schemas.microsoft.com/office/drawing/2010/main" val="0"/>
+              </a:ext>
+            </a:extLst>
+          </a:blip>
+          <a:stretch>
+            <a:fillRect/>
+          </a:stretch>
+        </p:blipFill>
+        <p:spPr>
+          <a:xfrm>
+            <a:off x="1287376" y="2615066"/>
+            <a:ext cx="2815391" cy="2111544"/>
+          </a:xfrm>
+          <a:prstGeom prst="rect">
+            <a:avLst/>
+          </a:prstGeom>
+          <a:solidFill>
+            <a:srgbClr val="FFFFFF">
+              <a:shade val="85000"/>
+            </a:srgbClr>
+          </a:solidFill>
+          <a:ln w="88900" cap="sq">
+            <a:solidFill>
+              <a:schemeClr val="bg2">
+                <a:lumMod val="50000"/>
+              </a:schemeClr>
+            </a:solidFill>
+            <a:miter lim="800000"/>
+          </a:ln>
+          <a:effectLst>
+            <a:outerShdw blurRad="55000" dist="18000" dir="5400000" algn="tl" rotWithShape="0">
+              <a:srgbClr val="000000">
+                <a:alpha val="40000"/>
+              </a:srgbClr>
+            </a:outerShdw>
+          </a:effectLst>
+          <a:scene3d>
+            <a:camera prst="orthographicFront"/>
+            <a:lightRig rig="twoPt" dir="t">
+              <a:rot lat="0" lon="0" rev="7200000"/>
+            </a:lightRig>
+          </a:scene3d>
+          <a:sp3d>
+            <a:bevelT w="25400" h="19050"/>
+            <a:contourClr>
+              <a:srgbClr val="FFFFFF"/>
+            </a:contourClr>
+          </a:sp3d>
+        </p:spPr>
+      </p:pic>
+      <p:pic>
+        <p:nvPicPr>
+          <p:cNvPr id="5" name="Picture 4"/>
+          <p:cNvPicPr>
+            <a:picLocks noChangeAspect="1"/>
+          </p:cNvPicPr>
+          <p:nvPr/>
+        </p:nvPicPr>
+        <p:blipFill>
+          <a:blip r:embed="rId3">
+            <a:extLst>
+              <a:ext uri="{28A0092B-C50C-407E-A947-70E740481C1C}">
+                <a14:useLocalDpi xmlns:a14="http://schemas.microsoft.com/office/drawing/2010/main" val="0"/>
+              </a:ext>
+            </a:extLst>
+          </a:blip>
+          <a:stretch>
+            <a:fillRect/>
+          </a:stretch>
+        </p:blipFill>
+        <p:spPr>
+          <a:xfrm>
+            <a:off x="4887814" y="2624957"/>
+            <a:ext cx="2816352" cy="2112264"/>
+          </a:xfrm>
+          <a:prstGeom prst="rect">
+            <a:avLst/>
+          </a:prstGeom>
+          <a:solidFill>
+            <a:srgbClr val="FFFFFF">
+              <a:shade val="85000"/>
+            </a:srgbClr>
+          </a:solidFill>
+          <a:ln w="88900" cap="sq">
+            <a:solidFill>
+              <a:schemeClr val="bg2">
+                <a:lumMod val="50000"/>
+              </a:schemeClr>
+            </a:solidFill>
+            <a:miter lim="800000"/>
+          </a:ln>
+          <a:effectLst>
+            <a:outerShdw blurRad="55000" dist="18000" dir="5400000" algn="tl" rotWithShape="0">
+              <a:srgbClr val="000000">
+                <a:alpha val="40000"/>
+              </a:srgbClr>
+            </a:outerShdw>
+          </a:effectLst>
+          <a:scene3d>
+            <a:camera prst="orthographicFront"/>
+            <a:lightRig rig="twoPt" dir="t">
+              <a:rot lat="0" lon="0" rev="7200000"/>
+            </a:lightRig>
+          </a:scene3d>
+          <a:sp3d>
+            <a:bevelT w="25400" h="19050"/>
+            <a:contourClr>
+              <a:srgbClr val="FFFFFF"/>
+            </a:contourClr>
+          </a:sp3d>
+        </p:spPr>
+      </p:pic>
     </p:spTree>
     <p:extLst>
       <p:ext uri="{BB962C8B-B14F-4D97-AF65-F5344CB8AC3E}">
@@ -14379,7 +14507,17 @@
           <a:bodyPr/>
           <a:lstStyle/>
           <a:p>
-            <a:endParaRPr lang="en-US"/>
+            <a:r>
+              <a:rPr lang="en-US" sz="2800" dirty="0" err="1"/>
+              <a:t>AdaBoost</a:t>
+            </a:r>
+            <a:r>
+              <a:rPr lang="en-US" sz="2800" dirty="0"/>
+              <a:t> Framework</a:t>
+            </a:r>
+          </a:p>
+          <a:p>
+            <a:endParaRPr lang="en-US" dirty="0"/>
           </a:p>
         </p:txBody>
       </p:sp>
@@ -14518,16 +14656,111 @@
           </a:xfrm>
         </p:spPr>
         <p:txBody>
-          <a:bodyPr/>
+          <a:bodyPr>
+            <a:normAutofit/>
+          </a:bodyPr>
           <a:lstStyle/>
           <a:p>
             <a:pPr marL="0" indent="0">
               <a:buNone/>
             </a:pPr>
             <a:r>
-              <a:rPr lang="en-US" dirty="0"/>
+              <a:rPr lang="en-US" sz="2400" dirty="0"/>
               <a:t>References:</a:t>
             </a:r>
+          </a:p>
+          <a:p>
+            <a:pPr marL="0" indent="0">
+              <a:buNone/>
+            </a:pPr>
+            <a:r>
+              <a:rPr lang="en-US" sz="1800" dirty="0" smtClean="0"/>
+              <a:t>[blank person</a:t>
+            </a:r>
+            <a:r>
+              <a:rPr lang="en-US" sz="1800" dirty="0"/>
+              <a:t>] </a:t>
+            </a:r>
+            <a:r>
+              <a:rPr lang="en-US" sz="1800" dirty="0" smtClean="0"/>
+              <a:t>Retrieved 3/9/2017 </a:t>
+            </a:r>
+            <a:r>
+              <a:rPr lang="en-US" sz="1800" dirty="0"/>
+              <a:t>from https://img.clipartfest.com/8be7c9a62f86421bba3845f5e357abc7_clipart-person-icon-cliparts-clipart-person-symbol_620-800.png </a:t>
+            </a:r>
+            <a:endParaRPr lang="en-US" sz="1800" dirty="0" smtClean="0"/>
+          </a:p>
+          <a:p>
+            <a:pPr marL="0" indent="0">
+              <a:buNone/>
+            </a:pPr>
+            <a:r>
+              <a:rPr lang="en-US" sz="1800" dirty="0" smtClean="0"/>
+              <a:t>[</a:t>
+            </a:r>
+            <a:r>
+              <a:rPr lang="en-US" sz="1800" dirty="0"/>
+              <a:t>DNA Promoter Region] </a:t>
+            </a:r>
+            <a:r>
+              <a:rPr lang="en-US" sz="1800" dirty="0" smtClean="0"/>
+              <a:t>Retrieved 3/9/2017 http</a:t>
+            </a:r>
+            <a:r>
+              <a:rPr lang="en-US" sz="1800" dirty="0"/>
+              <a:t>://</a:t>
+            </a:r>
+            <a:r>
+              <a:rPr lang="en-US" sz="1800" dirty="0" smtClean="0"/>
+              <a:t>web2.mendelu.cz/af_291_projekty2/</a:t>
+            </a:r>
+            <a:r>
+              <a:rPr lang="en-US" sz="1800" dirty="0" err="1" smtClean="0"/>
+              <a:t>vseo</a:t>
+            </a:r>
+            <a:r>
+              <a:rPr lang="en-US" sz="1800" dirty="0" smtClean="0"/>
+              <a:t>/</a:t>
+            </a:r>
+            <a:r>
+              <a:rPr lang="en-US" sz="1800" dirty="0" err="1" smtClean="0"/>
+              <a:t>print.php?page</a:t>
+            </a:r>
+            <a:r>
+              <a:rPr lang="en-US" sz="1800" dirty="0" smtClean="0"/>
+              <a:t>=307&amp;typ=html</a:t>
+            </a:r>
+            <a:endParaRPr lang="en-US" sz="1800" dirty="0"/>
+          </a:p>
+          <a:p>
+            <a:pPr marL="0" indent="0">
+              <a:buNone/>
+            </a:pPr>
+            <a:r>
+              <a:rPr lang="en-US" sz="1800" dirty="0" smtClean="0"/>
+              <a:t>[Google Big Query Symbol] Retrieved 3/9/2017 from </a:t>
+            </a:r>
+            <a:endParaRPr lang="en-US" sz="1800" dirty="0" smtClean="0"/>
+          </a:p>
+          <a:p>
+            <a:pPr marL="0" indent="0">
+              <a:buNone/>
+            </a:pPr>
+            <a:r>
+              <a:rPr lang="en-US" sz="1800" dirty="0"/>
+              <a:t>http://</a:t>
+            </a:r>
+            <a:r>
+              <a:rPr lang="en-US" sz="1800" dirty="0" smtClean="0"/>
+              <a:t>dwhlaureate.blogspot.com/2016/01/google-bigquery-externalized-version-of.html</a:t>
+            </a:r>
+          </a:p>
+          <a:p>
+            <a:pPr marL="0" indent="0">
+              <a:buNone/>
+            </a:pPr>
+            <a:endParaRPr lang="en-US" sz="1800" dirty="0"/>
           </a:p>
           <a:p>
             <a:pPr marL="0" indent="0">
@@ -14535,7 +14768,7 @@
             </a:pPr>
             <a:r>
               <a:rPr lang="en-US" sz="2400" dirty="0" smtClean="0"/>
-              <a:t>[1]</a:t>
+              <a:t>Acknowledgements:</a:t>
             </a:r>
           </a:p>
           <a:p>
@@ -14543,8 +14776,8 @@
               <a:buNone/>
             </a:pPr>
             <a:r>
-              <a:rPr lang="en-US" sz="2400" dirty="0" smtClean="0"/>
-              <a:t>[2]</a:t>
+              <a:rPr lang="en-US" sz="1900" dirty="0" smtClean="0"/>
+              <a:t>We would like to thank Sheila Reynolds from the Institute for Systems Biology for giving access to this data and provision google credits to fund our project. </a:t>
             </a:r>
           </a:p>
           <a:p>
@@ -14552,31 +14785,29 @@
               <a:buNone/>
             </a:pPr>
             <a:r>
-              <a:rPr lang="en-US" sz="2400" dirty="0" smtClean="0"/>
-              <a:t>[3]</a:t>
+              <a:rPr lang="en-US" sz="1900" dirty="0" smtClean="0"/>
+              <a:t>We would also like to thank Bill Noble and Max </a:t>
+            </a:r>
+            <a:r>
+              <a:rPr lang="en-US" sz="1900" dirty="0" err="1" smtClean="0"/>
+              <a:t>Libbretch</a:t>
+            </a:r>
+            <a:r>
+              <a:rPr lang="en-US" sz="1900" dirty="0" smtClean="0"/>
+              <a:t> for helpful advice.</a:t>
             </a:r>
           </a:p>
           <a:p>
             <a:pPr marL="0" indent="0">
               <a:buNone/>
             </a:pPr>
-            <a:r>
-              <a:rPr lang="en-US" sz="2400" dirty="0" smtClean="0"/>
-              <a:t>[4]</a:t>
-            </a:r>
             <a:endParaRPr lang="en-US" sz="2400" dirty="0"/>
-          </a:p>
-          <a:p>
-            <a:endParaRPr lang="en-US" dirty="0" smtClean="0"/>
           </a:p>
           <a:p>
             <a:pPr marL="0" indent="0">
               <a:buNone/>
             </a:pPr>
-            <a:r>
-              <a:rPr lang="en-US" dirty="0" smtClean="0"/>
-              <a:t>Acknowledgements</a:t>
-            </a:r>
+            <a:endParaRPr lang="en-US" sz="1800" dirty="0" smtClean="0"/>
           </a:p>
         </p:txBody>
       </p:sp>

</xml_diff>